<commit_message>
OpenTBS 1.8.0-beta new features. We are closed to the release.
</commit_message>
<xml_diff>
--- a/demo/demo_ms_powerpoint.pptx
+++ b/demo/demo_ms_powerpoint.pptx
@@ -6,6 +6,7 @@
   </p:sldMasterIdLst>
   <p:sldIdLst>
     <p:sldId id="256" r:id="rId2"/>
+    <p:sldId id="257" r:id="rId3"/>
   </p:sldIdLst>
   <p:sldSz cx="9144000" cy="6858000" type="screen4x3"/>
   <p:notesSz cx="6858000" cy="9144000"/>
@@ -328,7 +329,7 @@
               <a:pPr>
                 <a:defRPr/>
               </a:pPr>
-              <a:t>07/05/2011</a:t>
+              <a:t>09/01/2013</a:t>
             </a:fld>
             <a:endParaRPr lang="fr-FR"/>
           </a:p>
@@ -520,7 +521,7 @@
               <a:pPr>
                 <a:defRPr/>
               </a:pPr>
-              <a:t>07/05/2011</a:t>
+              <a:t>09/01/2013</a:t>
             </a:fld>
             <a:endParaRPr lang="fr-FR"/>
           </a:p>
@@ -722,7 +723,7 @@
               <a:pPr>
                 <a:defRPr/>
               </a:pPr>
-              <a:t>07/05/2011</a:t>
+              <a:t>09/01/2013</a:t>
             </a:fld>
             <a:endParaRPr lang="fr-FR"/>
           </a:p>
@@ -914,7 +915,7 @@
               <a:pPr>
                 <a:defRPr/>
               </a:pPr>
-              <a:t>07/05/2011</a:t>
+              <a:t>09/01/2013</a:t>
             </a:fld>
             <a:endParaRPr lang="fr-FR"/>
           </a:p>
@@ -1182,7 +1183,7 @@
               <a:pPr>
                 <a:defRPr/>
               </a:pPr>
-              <a:t>07/05/2011</a:t>
+              <a:t>09/01/2013</a:t>
             </a:fld>
             <a:endParaRPr lang="fr-FR"/>
           </a:p>
@@ -1492,7 +1493,7 @@
               <a:pPr>
                 <a:defRPr/>
               </a:pPr>
-              <a:t>07/05/2011</a:t>
+              <a:t>09/01/2013</a:t>
             </a:fld>
             <a:endParaRPr lang="fr-FR"/>
           </a:p>
@@ -1936,7 +1937,7 @@
               <a:pPr>
                 <a:defRPr/>
               </a:pPr>
-              <a:t>07/05/2011</a:t>
+              <a:t>09/01/2013</a:t>
             </a:fld>
             <a:endParaRPr lang="fr-FR"/>
           </a:p>
@@ -2076,7 +2077,7 @@
               <a:pPr>
                 <a:defRPr/>
               </a:pPr>
-              <a:t>07/05/2011</a:t>
+              <a:t>09/01/2013</a:t>
             </a:fld>
             <a:endParaRPr lang="fr-FR"/>
           </a:p>
@@ -2193,7 +2194,7 @@
               <a:pPr>
                 <a:defRPr/>
               </a:pPr>
-              <a:t>07/05/2011</a:t>
+              <a:t>09/01/2013</a:t>
             </a:fld>
             <a:endParaRPr lang="fr-FR"/>
           </a:p>
@@ -2492,7 +2493,7 @@
               <a:pPr>
                 <a:defRPr/>
               </a:pPr>
-              <a:t>07/05/2011</a:t>
+              <a:t>09/01/2013</a:t>
             </a:fld>
             <a:endParaRPr lang="fr-FR"/>
           </a:p>
@@ -2770,7 +2771,7 @@
               <a:pPr>
                 <a:defRPr/>
               </a:pPr>
-              <a:t>07/05/2011</a:t>
+              <a:t>09/01/2013</a:t>
             </a:fld>
             <a:endParaRPr lang="fr-FR"/>
           </a:p>
@@ -3026,7 +3027,7 @@
               <a:pPr>
                 <a:defRPr/>
               </a:pPr>
-              <a:t>07/05/2011</a:t>
+              <a:t>09/01/2013</a:t>
             </a:fld>
             <a:endParaRPr lang="fr-FR"/>
           </a:p>
@@ -3633,6 +3634,89 @@
 </p:sld>
 </file>
 
+<file path=ppt/slides/slide2.xml><?xml version="1.0" encoding="utf-8"?>
+<p:sld xmlns:a="http://schemas.openxmlformats.org/drawingml/2006/main" xmlns:r="http://schemas.openxmlformats.org/officeDocument/2006/relationships" xmlns:p="http://schemas.openxmlformats.org/presentationml/2006/main">
+  <p:cSld>
+    <p:spTree>
+      <p:nvGrpSpPr>
+        <p:cNvPr id="1" name=""/>
+        <p:cNvGrpSpPr/>
+        <p:nvPr/>
+      </p:nvGrpSpPr>
+      <p:grpSpPr>
+        <a:xfrm>
+          <a:off x="0" y="0"/>
+          <a:ext cx="0" cy="0"/>
+          <a:chOff x="0" y="0"/>
+          <a:chExt cx="0" cy="0"/>
+        </a:xfrm>
+      </p:grpSpPr>
+      <p:sp>
+        <p:nvSpPr>
+          <p:cNvPr id="2" name="Titre 1"/>
+          <p:cNvSpPr>
+            <a:spLocks noGrp="1"/>
+          </p:cNvSpPr>
+          <p:nvPr>
+            <p:ph type="title"/>
+          </p:nvPr>
+        </p:nvSpPr>
+        <p:spPr/>
+        <p:txBody>
+          <a:bodyPr/>
+          <a:lstStyle/>
+          <a:p>
+            <a:r>
+              <a:rPr lang="fr-FR" noProof="1" smtClean="0"/>
+              <a:t>Nice picture in slide #2</a:t>
+            </a:r>
+            <a:endParaRPr lang="fr-FR" noProof="1"/>
+          </a:p>
+        </p:txBody>
+      </p:sp>
+      <p:pic>
+        <p:nvPicPr>
+          <p:cNvPr id="4" name="Image 3" descr="#merge_me#"/>
+          <p:cNvPicPr>
+            <a:picLocks noChangeAspect="1"/>
+          </p:cNvPicPr>
+          <p:nvPr/>
+        </p:nvPicPr>
+        <p:blipFill>
+          <a:blip r:embed="rId2">
+            <a:extLst>
+              <a:ext uri="{28A0092B-C50C-407E-A947-70E740481C1C}">
+                <a14:useLocalDpi xmlns:a14="http://schemas.microsoft.com/office/drawing/2010/main" val="0"/>
+              </a:ext>
+            </a:extLst>
+          </a:blip>
+          <a:stretch>
+            <a:fillRect/>
+          </a:stretch>
+        </p:blipFill>
+        <p:spPr>
+          <a:xfrm>
+            <a:off x="4006721" y="2420888"/>
+            <a:ext cx="1130558" cy="1511644"/>
+          </a:xfrm>
+          <a:prstGeom prst="rect">
+            <a:avLst/>
+          </a:prstGeom>
+        </p:spPr>
+      </p:pic>
+    </p:spTree>
+    <p:extLst>
+      <p:ext uri="{BB962C8B-B14F-4D97-AF65-F5344CB8AC3E}">
+        <p14:creationId xmlns:p14="http://schemas.microsoft.com/office/powerpoint/2010/main" val="889761564"/>
+      </p:ext>
+    </p:extLst>
+  </p:cSld>
+  <p:clrMapOvr>
+    <a:masterClrMapping/>
+  </p:clrMapOvr>
+</p:sld>
+</file>
+
 <file path=ppt/theme/theme1.xml><?xml version="1.0" encoding="utf-8"?>
 <a:theme xmlns:a="http://schemas.openxmlformats.org/drawingml/2006/main" name="Thème Office">
   <a:themeElements>

</xml_diff>

<commit_message>
OpenTBS 1.8.0 new command OPENTBS_SEARCH_IN_SLIDE
</commit_message>
<xml_diff>
--- a/demo/demo_ms_powerpoint.pptx
+++ b/demo/demo_ms_powerpoint.pptx
@@ -7,6 +7,7 @@
   <p:sldIdLst>
     <p:sldId id="256" r:id="rId2"/>
     <p:sldId id="257" r:id="rId3"/>
+    <p:sldId id="258" r:id="rId4"/>
   </p:sldIdLst>
   <p:sldSz cx="9144000" cy="6858000" type="screen4x3"/>
   <p:notesSz cx="6858000" cy="9144000"/>
@@ -138,6 +139,299 @@
 </p:presentation>
 </file>
 
+<file path=ppt/charts/chart1.xml><?xml version="1.0" encoding="utf-8"?>
+<c:chartSpace xmlns:c="http://schemas.openxmlformats.org/drawingml/2006/chart" xmlns:a="http://schemas.openxmlformats.org/drawingml/2006/main" xmlns:r="http://schemas.openxmlformats.org/officeDocument/2006/relationships">
+  <c:date1904 val="0"/>
+  <c:lang val="fr-FR"/>
+  <c:roundedCorners val="0"/>
+  <mc:AlternateContent xmlns:mc="http://schemas.openxmlformats.org/markup-compatibility/2006">
+    <mc:Choice xmlns:c14="http://schemas.microsoft.com/office/drawing/2007/8/2/chart" Requires="c14">
+      <c14:style val="102"/>
+    </mc:Choice>
+    <mc:Fallback>
+      <c:style val="2"/>
+    </mc:Fallback>
+  </mc:AlternateContent>
+  <c:chart>
+    <c:autoTitleDeleted val="0"/>
+    <c:view3D>
+      <c:rotX val="15"/>
+      <c:rotY val="20"/>
+      <c:rAngAx val="1"/>
+    </c:view3D>
+    <c:floor>
+      <c:thickness val="0"/>
+    </c:floor>
+    <c:sideWall>
+      <c:thickness val="0"/>
+    </c:sideWall>
+    <c:backWall>
+      <c:thickness val="0"/>
+    </c:backWall>
+    <c:plotArea>
+      <c:layout/>
+      <c:bar3DChart>
+        <c:barDir val="col"/>
+        <c:grouping val="clustered"/>
+        <c:varyColors val="0"/>
+        <c:ser>
+          <c:idx val="0"/>
+          <c:order val="0"/>
+          <c:tx>
+            <c:strRef>
+              <c:f>Feuil1!$B$1</c:f>
+              <c:strCache>
+                <c:ptCount val="1"/>
+                <c:pt idx="0">
+                  <c:v>Template</c:v>
+                </c:pt>
+              </c:strCache>
+            </c:strRef>
+          </c:tx>
+          <c:invertIfNegative val="0"/>
+          <c:cat>
+            <c:strRef>
+              <c:f>Feuil1!$A$2:$A$5</c:f>
+              <c:strCache>
+                <c:ptCount val="4"/>
+                <c:pt idx="0">
+                  <c:v>Cat. A</c:v>
+                </c:pt>
+                <c:pt idx="1">
+                  <c:v>Cat. B</c:v>
+                </c:pt>
+                <c:pt idx="2">
+                  <c:v>Cat. C</c:v>
+                </c:pt>
+                <c:pt idx="3">
+                  <c:v>Cat. D</c:v>
+                </c:pt>
+              </c:strCache>
+            </c:strRef>
+          </c:cat>
+          <c:val>
+            <c:numRef>
+              <c:f>Feuil1!$B$2:$B$5</c:f>
+              <c:numCache>
+                <c:formatCode>General</c:formatCode>
+                <c:ptCount val="4"/>
+                <c:pt idx="0">
+                  <c:v>1.5</c:v>
+                </c:pt>
+                <c:pt idx="1">
+                  <c:v>1.1000000000000001</c:v>
+                </c:pt>
+                <c:pt idx="2">
+                  <c:v>0.5</c:v>
+                </c:pt>
+                <c:pt idx="3">
+                  <c:v>0.2</c:v>
+                </c:pt>
+              </c:numCache>
+            </c:numRef>
+          </c:val>
+        </c:ser>
+        <c:ser>
+          <c:idx val="1"/>
+          <c:order val="1"/>
+          <c:tx>
+            <c:strRef>
+              <c:f>Feuil1!$C$1</c:f>
+              <c:strCache>
+                <c:ptCount val="1"/>
+                <c:pt idx="0">
+                  <c:v>Series #2</c:v>
+                </c:pt>
+              </c:strCache>
+            </c:strRef>
+          </c:tx>
+          <c:invertIfNegative val="0"/>
+          <c:cat>
+            <c:strRef>
+              <c:f>Feuil1!$A$2:$A$5</c:f>
+              <c:strCache>
+                <c:ptCount val="4"/>
+                <c:pt idx="0">
+                  <c:v>Cat. A</c:v>
+                </c:pt>
+                <c:pt idx="1">
+                  <c:v>Cat. B</c:v>
+                </c:pt>
+                <c:pt idx="2">
+                  <c:v>Cat. C</c:v>
+                </c:pt>
+                <c:pt idx="3">
+                  <c:v>Cat. D</c:v>
+                </c:pt>
+              </c:strCache>
+            </c:strRef>
+          </c:cat>
+          <c:val>
+            <c:numRef>
+              <c:f>Feuil1!$C$2:$C$5</c:f>
+              <c:numCache>
+                <c:formatCode>General</c:formatCode>
+                <c:ptCount val="4"/>
+                <c:pt idx="0">
+                  <c:v>0.3</c:v>
+                </c:pt>
+                <c:pt idx="1">
+                  <c:v>0.7</c:v>
+                </c:pt>
+                <c:pt idx="2">
+                  <c:v>1.2</c:v>
+                </c:pt>
+                <c:pt idx="3">
+                  <c:v>1.5</c:v>
+                </c:pt>
+              </c:numCache>
+            </c:numRef>
+          </c:val>
+        </c:ser>
+        <c:ser>
+          <c:idx val="2"/>
+          <c:order val="2"/>
+          <c:tx>
+            <c:strRef>
+              <c:f>Feuil1!$D$1</c:f>
+              <c:strCache>
+                <c:ptCount val="1"/>
+                <c:pt idx="0">
+                  <c:v>Series #3</c:v>
+                </c:pt>
+              </c:strCache>
+            </c:strRef>
+          </c:tx>
+          <c:invertIfNegative val="0"/>
+          <c:cat>
+            <c:strRef>
+              <c:f>Feuil1!$A$2:$A$5</c:f>
+              <c:strCache>
+                <c:ptCount val="4"/>
+                <c:pt idx="0">
+                  <c:v>Cat. A</c:v>
+                </c:pt>
+                <c:pt idx="1">
+                  <c:v>Cat. B</c:v>
+                </c:pt>
+                <c:pt idx="2">
+                  <c:v>Cat. C</c:v>
+                </c:pt>
+                <c:pt idx="3">
+                  <c:v>Cat. D</c:v>
+                </c:pt>
+              </c:strCache>
+            </c:strRef>
+          </c:cat>
+          <c:val>
+            <c:numRef>
+              <c:f>Feuil1!$D$2:$D$5</c:f>
+              <c:numCache>
+                <c:formatCode>General</c:formatCode>
+                <c:ptCount val="4"/>
+                <c:pt idx="0">
+                  <c:v>1.5</c:v>
+                </c:pt>
+                <c:pt idx="1">
+                  <c:v>1.7</c:v>
+                </c:pt>
+                <c:pt idx="2">
+                  <c:v>1.6</c:v>
+                </c:pt>
+                <c:pt idx="3">
+                  <c:v>1.3</c:v>
+                </c:pt>
+              </c:numCache>
+            </c:numRef>
+          </c:val>
+        </c:ser>
+        <c:dLbls>
+          <c:showLegendKey val="0"/>
+          <c:showVal val="0"/>
+          <c:showCatName val="0"/>
+          <c:showSerName val="0"/>
+          <c:showPercent val="0"/>
+          <c:showBubbleSize val="0"/>
+        </c:dLbls>
+        <c:gapWidth val="150"/>
+        <c:shape val="cylinder"/>
+        <c:axId val="66026880"/>
+        <c:axId val="66037248"/>
+        <c:axId val="0"/>
+      </c:bar3DChart>
+      <c:catAx>
+        <c:axId val="66026880"/>
+        <c:scaling>
+          <c:orientation val="minMax"/>
+        </c:scaling>
+        <c:delete val="0"/>
+        <c:axPos val="b"/>
+        <c:majorTickMark val="out"/>
+        <c:minorTickMark val="none"/>
+        <c:tickLblPos val="nextTo"/>
+        <c:txPr>
+          <a:bodyPr/>
+          <a:lstStyle/>
+          <a:p>
+            <a:pPr>
+              <a:defRPr sz="1800"/>
+            </a:pPr>
+            <a:endParaRPr lang="fr-FR"/>
+          </a:p>
+        </c:txPr>
+        <c:crossAx val="66037248"/>
+        <c:crosses val="autoZero"/>
+        <c:auto val="1"/>
+        <c:lblAlgn val="ctr"/>
+        <c:lblOffset val="100"/>
+        <c:noMultiLvlLbl val="0"/>
+      </c:catAx>
+      <c:valAx>
+        <c:axId val="66037248"/>
+        <c:scaling>
+          <c:orientation val="minMax"/>
+          <c:max val="5"/>
+          <c:min val="0"/>
+        </c:scaling>
+        <c:delete val="0"/>
+        <c:axPos val="l"/>
+        <c:majorGridlines/>
+        <c:numFmt formatCode="General" sourceLinked="1"/>
+        <c:majorTickMark val="out"/>
+        <c:minorTickMark val="none"/>
+        <c:tickLblPos val="nextTo"/>
+        <c:crossAx val="66026880"/>
+        <c:crosses val="autoZero"/>
+        <c:crossBetween val="between"/>
+        <c:majorUnit val="0.5"/>
+        <c:minorUnit val="0.1"/>
+      </c:valAx>
+    </c:plotArea>
+    <c:legend>
+      <c:legendPos val="r"/>
+      <c:layout/>
+      <c:overlay val="0"/>
+    </c:legend>
+    <c:plotVisOnly val="1"/>
+    <c:dispBlanksAs val="gap"/>
+    <c:showDLblsOverMax val="0"/>
+  </c:chart>
+  <c:txPr>
+    <a:bodyPr/>
+    <a:lstStyle/>
+    <a:p>
+      <a:pPr>
+        <a:defRPr sz="1800"/>
+      </a:pPr>
+      <a:endParaRPr lang="fr-FR"/>
+    </a:p>
+  </c:txPr>
+  <c:externalData r:id="rId1">
+    <c:autoUpdate val="0"/>
+  </c:externalData>
+</c:chartSpace>
+</file>
+
 <file path=ppt/slideLayouts/slideLayout1.xml><?xml version="1.0" encoding="utf-8"?>
 <p:sldLayout xmlns:a="http://schemas.openxmlformats.org/drawingml/2006/main" xmlns:r="http://schemas.openxmlformats.org/officeDocument/2006/relationships" xmlns:p="http://schemas.openxmlformats.org/presentationml/2006/main" type="title" preserve="1">
   <p:cSld name="Diapositive de titre">
@@ -329,7 +623,7 @@
               <a:pPr>
                 <a:defRPr/>
               </a:pPr>
-              <a:t>09/01/2013</a:t>
+              <a:t>16/01/2013</a:t>
             </a:fld>
             <a:endParaRPr lang="fr-FR"/>
           </a:p>
@@ -521,7 +815,7 @@
               <a:pPr>
                 <a:defRPr/>
               </a:pPr>
-              <a:t>09/01/2013</a:t>
+              <a:t>16/01/2013</a:t>
             </a:fld>
             <a:endParaRPr lang="fr-FR"/>
           </a:p>
@@ -723,7 +1017,7 @@
               <a:pPr>
                 <a:defRPr/>
               </a:pPr>
-              <a:t>09/01/2013</a:t>
+              <a:t>16/01/2013</a:t>
             </a:fld>
             <a:endParaRPr lang="fr-FR"/>
           </a:p>
@@ -915,7 +1209,7 @@
               <a:pPr>
                 <a:defRPr/>
               </a:pPr>
-              <a:t>09/01/2013</a:t>
+              <a:t>16/01/2013</a:t>
             </a:fld>
             <a:endParaRPr lang="fr-FR"/>
           </a:p>
@@ -1183,7 +1477,7 @@
               <a:pPr>
                 <a:defRPr/>
               </a:pPr>
-              <a:t>09/01/2013</a:t>
+              <a:t>16/01/2013</a:t>
             </a:fld>
             <a:endParaRPr lang="fr-FR"/>
           </a:p>
@@ -1493,7 +1787,7 @@
               <a:pPr>
                 <a:defRPr/>
               </a:pPr>
-              <a:t>09/01/2013</a:t>
+              <a:t>16/01/2013</a:t>
             </a:fld>
             <a:endParaRPr lang="fr-FR"/>
           </a:p>
@@ -1937,7 +2231,7 @@
               <a:pPr>
                 <a:defRPr/>
               </a:pPr>
-              <a:t>09/01/2013</a:t>
+              <a:t>16/01/2013</a:t>
             </a:fld>
             <a:endParaRPr lang="fr-FR"/>
           </a:p>
@@ -2077,7 +2371,7 @@
               <a:pPr>
                 <a:defRPr/>
               </a:pPr>
-              <a:t>09/01/2013</a:t>
+              <a:t>16/01/2013</a:t>
             </a:fld>
             <a:endParaRPr lang="fr-FR"/>
           </a:p>
@@ -2194,7 +2488,7 @@
               <a:pPr>
                 <a:defRPr/>
               </a:pPr>
-              <a:t>09/01/2013</a:t>
+              <a:t>16/01/2013</a:t>
             </a:fld>
             <a:endParaRPr lang="fr-FR"/>
           </a:p>
@@ -2493,7 +2787,7 @@
               <a:pPr>
                 <a:defRPr/>
               </a:pPr>
-              <a:t>09/01/2013</a:t>
+              <a:t>16/01/2013</a:t>
             </a:fld>
             <a:endParaRPr lang="fr-FR"/>
           </a:p>
@@ -2771,7 +3065,7 @@
               <a:pPr>
                 <a:defRPr/>
               </a:pPr>
-              <a:t>09/01/2013</a:t>
+              <a:t>16/01/2013</a:t>
             </a:fld>
             <a:endParaRPr lang="fr-FR"/>
           </a:p>
@@ -3027,7 +3321,7 @@
               <a:pPr>
                 <a:defRPr/>
               </a:pPr>
-              <a:t>09/01/2013</a:t>
+              <a:t>16/01/2013</a:t>
             </a:fld>
             <a:endParaRPr lang="fr-FR"/>
           </a:p>
@@ -3668,7 +3962,7 @@
           <a:p>
             <a:r>
               <a:rPr lang="fr-FR" noProof="1" smtClean="0"/>
-              <a:t>Nice picture in slide #2</a:t>
+              <a:t>Merging a picture manually</a:t>
             </a:r>
             <a:endParaRPr lang="fr-FR" noProof="1"/>
           </a:p>
@@ -3704,10 +3998,198 @@
           </a:prstGeom>
         </p:spPr>
       </p:pic>
+      <p:sp>
+        <p:nvSpPr>
+          <p:cNvPr id="3" name="Rectangle 2"/>
+          <p:cNvSpPr/>
+          <p:nvPr/>
+        </p:nvSpPr>
+        <p:spPr>
+          <a:xfrm>
+            <a:off x="6372200" y="1556792"/>
+            <a:ext cx="2304256" cy="1224136"/>
+          </a:xfrm>
+          <a:prstGeom prst="wedgeRectCallout">
+            <a:avLst>
+              <a:gd name="adj1" fmla="val -94350"/>
+              <a:gd name="adj2" fmla="val 53531"/>
+            </a:avLst>
+          </a:prstGeom>
+        </p:spPr>
+        <p:style>
+          <a:lnRef idx="2">
+            <a:schemeClr val="accent1">
+              <a:shade val="50000"/>
+            </a:schemeClr>
+          </a:lnRef>
+          <a:fillRef idx="1">
+            <a:schemeClr val="accent1"/>
+          </a:fillRef>
+          <a:effectRef idx="0">
+            <a:schemeClr val="accent1"/>
+          </a:effectRef>
+          <a:fontRef idx="minor">
+            <a:schemeClr val="lt1"/>
+          </a:fontRef>
+        </p:style>
+        <p:txBody>
+          <a:bodyPr rtlCol="0" anchor="ctr"/>
+          <a:lstStyle/>
+          <a:p>
+            <a:pPr algn="ctr"/>
+            <a:r>
+              <a:rPr lang="en-US" sz="1100" noProof="1" smtClean="0"/>
+              <a:t>Here is an example of a picture merged with </a:t>
+            </a:r>
+            <a:r>
+              <a:rPr lang="en-US" sz="1100" noProof="1" smtClean="0"/>
+              <a:t>command </a:t>
+            </a:r>
+            <a:r>
+              <a:rPr lang="en-US" sz="1100" noProof="1" smtClean="0"/>
+              <a:t>OPENTBS_CHANGE_PICTURE.</a:t>
+            </a:r>
+            <a:br>
+              <a:rPr lang="en-US" sz="1100" noProof="1" smtClean="0"/>
+            </a:br>
+            <a:endParaRPr lang="en-US" sz="1100" noProof="1" smtClean="0"/>
+          </a:p>
+          <a:p>
+            <a:pPr algn="ctr"/>
+            <a:r>
+              <a:rPr lang="en-US" sz="1100" noProof="1" smtClean="0"/>
+              <a:t>The keyword to found the picture has to be placed in its title or descriptin. </a:t>
+            </a:r>
+            <a:endParaRPr lang="en-US" sz="1100" noProof="1"/>
+          </a:p>
+        </p:txBody>
+      </p:sp>
+      <p:sp>
+        <p:nvSpPr>
+          <p:cNvPr id="5" name="Rectangle 4"/>
+          <p:cNvSpPr/>
+          <p:nvPr/>
+        </p:nvSpPr>
+        <p:spPr>
+          <a:xfrm>
+            <a:off x="6084168" y="4077072"/>
+            <a:ext cx="2088232" cy="864096"/>
+          </a:xfrm>
+          <a:prstGeom prst="wedgeRectCallout">
+            <a:avLst>
+              <a:gd name="adj1" fmla="val -88799"/>
+              <a:gd name="adj2" fmla="val -160089"/>
+            </a:avLst>
+          </a:prstGeom>
+        </p:spPr>
+        <p:style>
+          <a:lnRef idx="2">
+            <a:schemeClr val="accent3">
+              <a:shade val="50000"/>
+            </a:schemeClr>
+          </a:lnRef>
+          <a:fillRef idx="1">
+            <a:schemeClr val="accent3"/>
+          </a:fillRef>
+          <a:effectRef idx="0">
+            <a:schemeClr val="accent3"/>
+          </a:effectRef>
+          <a:fontRef idx="minor">
+            <a:schemeClr val="lt1"/>
+          </a:fontRef>
+        </p:style>
+        <p:txBody>
+          <a:bodyPr rtlCol="0" anchor="ctr"/>
+          <a:lstStyle/>
+          <a:p>
+            <a:pPr algn="ctr"/>
+            <a:r>
+              <a:rPr lang="en-US" sz="1100" noProof="1" smtClean="0"/>
+              <a:t>Yu have to select the slide first at the PHP side otherwise the picture will not be found.</a:t>
+            </a:r>
+            <a:endParaRPr lang="en-US" sz="1100" noProof="1"/>
+          </a:p>
+        </p:txBody>
+      </p:sp>
     </p:spTree>
     <p:extLst>
       <p:ext uri="{BB962C8B-B14F-4D97-AF65-F5344CB8AC3E}">
         <p14:creationId xmlns:p14="http://schemas.microsoft.com/office/powerpoint/2010/main" val="889761564"/>
+      </p:ext>
+    </p:extLst>
+  </p:cSld>
+  <p:clrMapOvr>
+    <a:masterClrMapping/>
+  </p:clrMapOvr>
+</p:sld>
+</file>
+
+<file path=ppt/slides/slide3.xml><?xml version="1.0" encoding="utf-8"?>
+<p:sld xmlns:a="http://schemas.openxmlformats.org/drawingml/2006/main" xmlns:r="http://schemas.openxmlformats.org/officeDocument/2006/relationships" xmlns:p="http://schemas.openxmlformats.org/presentationml/2006/main">
+  <p:cSld>
+    <p:spTree>
+      <p:nvGrpSpPr>
+        <p:cNvPr id="1" name=""/>
+        <p:cNvGrpSpPr/>
+        <p:nvPr/>
+      </p:nvGrpSpPr>
+      <p:grpSpPr>
+        <a:xfrm>
+          <a:off x="0" y="0"/>
+          <a:ext cx="0" cy="0"/>
+          <a:chOff x="0" y="0"/>
+          <a:chExt cx="0" cy="0"/>
+        </a:xfrm>
+      </p:grpSpPr>
+      <p:sp>
+        <p:nvSpPr>
+          <p:cNvPr id="2" name="Titre 1"/>
+          <p:cNvSpPr>
+            <a:spLocks noGrp="1"/>
+          </p:cNvSpPr>
+          <p:nvPr>
+            <p:ph type="title"/>
+          </p:nvPr>
+        </p:nvSpPr>
+        <p:spPr/>
+        <p:txBody>
+          <a:bodyPr/>
+          <a:lstStyle/>
+          <a:p>
+            <a:r>
+              <a:rPr lang="en-US" noProof="1" smtClean="0"/>
+              <a:t>Merging a chart</a:t>
+            </a:r>
+            <a:endParaRPr lang="en-US" noProof="1"/>
+          </a:p>
+        </p:txBody>
+      </p:sp>
+      <p:graphicFrame>
+        <p:nvGraphicFramePr>
+          <p:cNvPr id="4" name="Graphique 3" title="my_chart"/>
+          <p:cNvGraphicFramePr/>
+          <p:nvPr>
+            <p:extLst>
+              <p:ext uri="{D42A27DB-BD31-4B8C-83A1-F6EECF244321}">
+                <p14:modId xmlns:p14="http://schemas.microsoft.com/office/powerpoint/2010/main" val="2463261424"/>
+              </p:ext>
+            </p:extLst>
+          </p:nvPr>
+        </p:nvGraphicFramePr>
+        <p:xfrm>
+          <a:off x="971600" y="1412776"/>
+          <a:ext cx="6648400" cy="4464496"/>
+        </p:xfrm>
+        <a:graphic>
+          <a:graphicData uri="http://schemas.openxmlformats.org/drawingml/2006/chart">
+            <c:chart xmlns:c="http://schemas.openxmlformats.org/drawingml/2006/chart" xmlns:r="http://schemas.openxmlformats.org/officeDocument/2006/relationships" r:id="rId2"/>
+          </a:graphicData>
+        </a:graphic>
+      </p:graphicFrame>
+    </p:spTree>
+    <p:extLst>
+      <p:ext uri="{BB962C8B-B14F-4D97-AF65-F5344CB8AC3E}">
+        <p14:creationId xmlns:p14="http://schemas.microsoft.com/office/powerpoint/2010/main" val="36976890"/>
       </p:ext>
     </p:extLst>
   </p:cSld>

</xml_diff>

<commit_message>
OpenTBS: slide operations for ODP too.
</commit_message>
<xml_diff>
--- a/demo/demo_ms_powerpoint.pptx
+++ b/demo/demo_ms_powerpoint.pptx
@@ -355,12 +355,12 @@
         </c:dLbls>
         <c:gapWidth val="150"/>
         <c:shape val="cylinder"/>
-        <c:axId val="50916352"/>
-        <c:axId val="21766912"/>
+        <c:axId val="76404992"/>
+        <c:axId val="50969216"/>
         <c:axId val="0"/>
       </c:bar3DChart>
       <c:catAx>
-        <c:axId val="50916352"/>
+        <c:axId val="76404992"/>
         <c:scaling>
           <c:orientation val="minMax"/>
         </c:scaling>
@@ -379,7 +379,7 @@
             <a:endParaRPr lang="fr-FR"/>
           </a:p>
         </c:txPr>
-        <c:crossAx val="21766912"/>
+        <c:crossAx val="50969216"/>
         <c:crosses val="autoZero"/>
         <c:auto val="1"/>
         <c:lblAlgn val="ctr"/>
@@ -387,7 +387,7 @@
         <c:noMultiLvlLbl val="0"/>
       </c:catAx>
       <c:valAx>
-        <c:axId val="21766912"/>
+        <c:axId val="50969216"/>
         <c:scaling>
           <c:orientation val="minMax"/>
           <c:max val="5"/>
@@ -400,7 +400,7 @@
         <c:majorTickMark val="out"/>
         <c:minorTickMark val="none"/>
         <c:tickLblPos val="nextTo"/>
-        <c:crossAx val="50916352"/>
+        <c:crossAx val="76404992"/>
         <c:crosses val="autoZero"/>
         <c:crossBetween val="between"/>
         <c:majorUnit val="0.5"/>
@@ -623,7 +623,7 @@
               <a:pPr>
                 <a:defRPr/>
               </a:pPr>
-              <a:t>19/01/2013</a:t>
+              <a:t>05/02/2013</a:t>
             </a:fld>
             <a:endParaRPr lang="fr-FR"/>
           </a:p>
@@ -815,7 +815,7 @@
               <a:pPr>
                 <a:defRPr/>
               </a:pPr>
-              <a:t>19/01/2013</a:t>
+              <a:t>05/02/2013</a:t>
             </a:fld>
             <a:endParaRPr lang="fr-FR"/>
           </a:p>
@@ -1017,7 +1017,7 @@
               <a:pPr>
                 <a:defRPr/>
               </a:pPr>
-              <a:t>19/01/2013</a:t>
+              <a:t>05/02/2013</a:t>
             </a:fld>
             <a:endParaRPr lang="fr-FR"/>
           </a:p>
@@ -1209,7 +1209,7 @@
               <a:pPr>
                 <a:defRPr/>
               </a:pPr>
-              <a:t>19/01/2013</a:t>
+              <a:t>05/02/2013</a:t>
             </a:fld>
             <a:endParaRPr lang="fr-FR"/>
           </a:p>
@@ -1477,7 +1477,7 @@
               <a:pPr>
                 <a:defRPr/>
               </a:pPr>
-              <a:t>19/01/2013</a:t>
+              <a:t>05/02/2013</a:t>
             </a:fld>
             <a:endParaRPr lang="fr-FR"/>
           </a:p>
@@ -1787,7 +1787,7 @@
               <a:pPr>
                 <a:defRPr/>
               </a:pPr>
-              <a:t>19/01/2013</a:t>
+              <a:t>05/02/2013</a:t>
             </a:fld>
             <a:endParaRPr lang="fr-FR"/>
           </a:p>
@@ -2231,7 +2231,7 @@
               <a:pPr>
                 <a:defRPr/>
               </a:pPr>
-              <a:t>19/01/2013</a:t>
+              <a:t>05/02/2013</a:t>
             </a:fld>
             <a:endParaRPr lang="fr-FR"/>
           </a:p>
@@ -2371,7 +2371,7 @@
               <a:pPr>
                 <a:defRPr/>
               </a:pPr>
-              <a:t>19/01/2013</a:t>
+              <a:t>05/02/2013</a:t>
             </a:fld>
             <a:endParaRPr lang="fr-FR"/>
           </a:p>
@@ -2488,7 +2488,7 @@
               <a:pPr>
                 <a:defRPr/>
               </a:pPr>
-              <a:t>19/01/2013</a:t>
+              <a:t>05/02/2013</a:t>
             </a:fld>
             <a:endParaRPr lang="fr-FR"/>
           </a:p>
@@ -2787,7 +2787,7 @@
               <a:pPr>
                 <a:defRPr/>
               </a:pPr>
-              <a:t>19/01/2013</a:t>
+              <a:t>05/02/2013</a:t>
             </a:fld>
             <a:endParaRPr lang="fr-FR"/>
           </a:p>
@@ -3065,7 +3065,7 @@
               <a:pPr>
                 <a:defRPr/>
               </a:pPr>
-              <a:t>19/01/2013</a:t>
+              <a:t>05/02/2013</a:t>
             </a:fld>
             <a:endParaRPr lang="fr-FR"/>
           </a:p>
@@ -3321,7 +3321,7 @@
               <a:pPr>
                 <a:defRPr/>
               </a:pPr>
-              <a:t>19/01/2013</a:t>
+              <a:t>05/02/2013</a:t>
             </a:fld>
             <a:endParaRPr lang="fr-FR"/>
           </a:p>
@@ -3920,6 +3920,66 @@
           </a:p>
         </p:txBody>
       </p:sp>
+      <p:sp>
+        <p:nvSpPr>
+          <p:cNvPr id="2" name="Rectangle à coins arrondis 1"/>
+          <p:cNvSpPr/>
+          <p:nvPr/>
+        </p:nvSpPr>
+        <p:spPr>
+          <a:xfrm>
+            <a:off x="539552" y="5301208"/>
+            <a:ext cx="3600400" cy="1080120"/>
+          </a:xfrm>
+          <a:prstGeom prst="wedgeRoundRectCallout">
+            <a:avLst>
+              <a:gd name="adj1" fmla="val 41236"/>
+              <a:gd name="adj2" fmla="val -115518"/>
+              <a:gd name="adj3" fmla="val 16667"/>
+            </a:avLst>
+          </a:prstGeom>
+        </p:spPr>
+        <p:style>
+          <a:lnRef idx="2">
+            <a:schemeClr val="accent6">
+              <a:shade val="50000"/>
+            </a:schemeClr>
+          </a:lnRef>
+          <a:fillRef idx="1">
+            <a:schemeClr val="accent6"/>
+          </a:fillRef>
+          <a:effectRef idx="0">
+            <a:schemeClr val="accent6"/>
+          </a:effectRef>
+          <a:fontRef idx="minor">
+            <a:schemeClr val="lt1"/>
+          </a:fontRef>
+        </p:style>
+        <p:txBody>
+          <a:bodyPr rtlCol="0" anchor="ctr"/>
+          <a:lstStyle/>
+          <a:p>
+            <a:pPr algn="ctr"/>
+            <a:r>
+              <a:rPr lang="en-US" sz="1200" dirty="0" smtClean="0">
+                <a:solidFill>
+                  <a:schemeClr val="accent2">
+                    <a:lumMod val="75000"/>
+                  </a:schemeClr>
+                </a:solidFill>
+              </a:rPr>
+              <a:t>There is a restriction specific to PowerPoint Presentations: it is not possible to multiply slides. But you can delete specific slides.</a:t>
+            </a:r>
+            <a:endParaRPr lang="en-US" sz="1200" dirty="0">
+              <a:solidFill>
+                <a:schemeClr val="accent2">
+                  <a:lumMod val="75000"/>
+                </a:schemeClr>
+              </a:solidFill>
+            </a:endParaRPr>
+          </a:p>
+        </p:txBody>
+      </p:sp>
     </p:spTree>
   </p:cSld>
   <p:clrMapOvr>
@@ -4050,15 +4110,7 @@
             <a:pPr algn="ctr"/>
             <a:r>
               <a:rPr lang="en-US" sz="1100" noProof="1" smtClean="0"/>
-              <a:t>The keyword to found the picture has to be placed in its title or </a:t>
-            </a:r>
-            <a:r>
-              <a:rPr lang="en-US" sz="1100" noProof="1" smtClean="0"/>
-              <a:t>description</a:t>
-            </a:r>
-            <a:r>
-              <a:rPr lang="en-US" sz="1100" noProof="1" smtClean="0"/>
-              <a:t>. </a:t>
+              <a:t>The keyword to found the picture has to be placed in its title or description. </a:t>
             </a:r>
             <a:endParaRPr lang="en-US" sz="1100" noProof="1"/>
           </a:p>
@@ -4105,7 +4157,7 @@
             <a:pPr algn="ctr"/>
             <a:r>
               <a:rPr lang="en-US" sz="1100" noProof="1" smtClean="0"/>
-              <a:t>Yu have to select the slide first at the PHP side otherwise the picture will not be found.</a:t>
+              <a:t>You have to select the slide first at the PHP side otherwise the picture will not be found.</a:t>
             </a:r>
             <a:endParaRPr lang="en-US" sz="1100" noProof="1"/>
           </a:p>
@@ -4151,16 +4203,104 @@
             <p:ph type="title"/>
           </p:nvPr>
         </p:nvSpPr>
-        <p:spPr/>
-        <p:txBody>
-          <a:bodyPr/>
+        <p:spPr>
+          <a:xfrm>
+            <a:off x="457200" y="274638"/>
+            <a:ext cx="4186808" cy="778098"/>
+          </a:xfrm>
+        </p:spPr>
+        <p:txBody>
+          <a:bodyPr>
+            <a:scene3d>
+              <a:camera prst="orthographicFront"/>
+              <a:lightRig rig="flat" dir="tl">
+                <a:rot lat="0" lon="0" rev="6600000"/>
+              </a:lightRig>
+            </a:scene3d>
+            <a:sp3d extrusionH="25400" contourW="8890">
+              <a:bevelT w="38100" h="31750"/>
+              <a:contourClr>
+                <a:schemeClr val="accent2">
+                  <a:shade val="75000"/>
+                </a:schemeClr>
+              </a:contourClr>
+            </a:sp3d>
+          </a:bodyPr>
           <a:lstStyle/>
           <a:p>
             <a:r>
-              <a:rPr lang="en-US" noProof="1" smtClean="0"/>
+              <a:rPr lang="en-US" b="1" noProof="1" smtClean="0">
+                <a:ln w="11430"/>
+                <a:gradFill>
+                  <a:gsLst>
+                    <a:gs pos="0">
+                      <a:schemeClr val="accent2">
+                        <a:tint val="70000"/>
+                        <a:satMod val="245000"/>
+                      </a:schemeClr>
+                    </a:gs>
+                    <a:gs pos="75000">
+                      <a:schemeClr val="accent2">
+                        <a:tint val="90000"/>
+                        <a:shade val="60000"/>
+                        <a:satMod val="240000"/>
+                      </a:schemeClr>
+                    </a:gs>
+                    <a:gs pos="100000">
+                      <a:schemeClr val="accent2">
+                        <a:tint val="100000"/>
+                        <a:shade val="50000"/>
+                        <a:satMod val="240000"/>
+                      </a:schemeClr>
+                    </a:gs>
+                  </a:gsLst>
+                  <a:lin ang="5400000"/>
+                </a:gradFill>
+                <a:effectLst>
+                  <a:outerShdw blurRad="50800" dist="39000" dir="5460000" algn="tl">
+                    <a:srgbClr val="000000">
+                      <a:alpha val="38000"/>
+                    </a:srgbClr>
+                  </a:outerShdw>
+                </a:effectLst>
+              </a:rPr>
               <a:t>Merging a chart</a:t>
             </a:r>
-            <a:endParaRPr lang="en-US" noProof="1"/>
+            <a:endParaRPr lang="en-US" b="1" noProof="1">
+              <a:ln w="11430"/>
+              <a:gradFill>
+                <a:gsLst>
+                  <a:gs pos="0">
+                    <a:schemeClr val="accent2">
+                      <a:tint val="70000"/>
+                      <a:satMod val="245000"/>
+                    </a:schemeClr>
+                  </a:gs>
+                  <a:gs pos="75000">
+                    <a:schemeClr val="accent2">
+                      <a:tint val="90000"/>
+                      <a:shade val="60000"/>
+                      <a:satMod val="240000"/>
+                    </a:schemeClr>
+                  </a:gs>
+                  <a:gs pos="100000">
+                    <a:schemeClr val="accent2">
+                      <a:tint val="100000"/>
+                      <a:shade val="50000"/>
+                      <a:satMod val="240000"/>
+                    </a:schemeClr>
+                  </a:gs>
+                </a:gsLst>
+                <a:lin ang="5400000"/>
+              </a:gradFill>
+              <a:effectLst>
+                <a:outerShdw blurRad="50800" dist="39000" dir="5460000" algn="tl">
+                  <a:srgbClr val="000000">
+                    <a:alpha val="38000"/>
+                  </a:srgbClr>
+                </a:outerShdw>
+              </a:effectLst>
+            </a:endParaRPr>
           </a:p>
         </p:txBody>
       </p:sp>
@@ -4186,6 +4326,63 @@
           </a:graphicData>
         </a:graphic>
       </p:graphicFrame>
+      <p:sp>
+        <p:nvSpPr>
+          <p:cNvPr id="3" name="Pensées 2"/>
+          <p:cNvSpPr/>
+          <p:nvPr/>
+        </p:nvSpPr>
+        <p:spPr>
+          <a:xfrm>
+            <a:off x="5220072" y="260648"/>
+            <a:ext cx="3600400" cy="1152128"/>
+          </a:xfrm>
+          <a:prstGeom prst="cloudCallout">
+            <a:avLst>
+              <a:gd name="adj1" fmla="val -15913"/>
+              <a:gd name="adj2" fmla="val 96229"/>
+            </a:avLst>
+          </a:prstGeom>
+        </p:spPr>
+        <p:style>
+          <a:lnRef idx="1">
+            <a:schemeClr val="dk1"/>
+          </a:lnRef>
+          <a:fillRef idx="2">
+            <a:schemeClr val="dk1"/>
+          </a:fillRef>
+          <a:effectRef idx="1">
+            <a:schemeClr val="dk1"/>
+          </a:effectRef>
+          <a:fontRef idx="minor">
+            <a:schemeClr val="dk1"/>
+          </a:fontRef>
+        </p:style>
+        <p:txBody>
+          <a:bodyPr rtlCol="0" anchor="ctr"/>
+          <a:lstStyle/>
+          <a:p>
+            <a:pPr algn="ctr"/>
+            <a:r>
+              <a:rPr lang="en-US" sz="1000" dirty="0" smtClean="0">
+                <a:solidFill>
+                  <a:schemeClr val="bg2">
+                    <a:lumMod val="50000"/>
+                  </a:schemeClr>
+                </a:solidFill>
+              </a:rPr>
+              <a:t>It’s quite easy to merge a chart in a PowerPoint Presentation. You can see that in the template, no bars can go above value « 2 ». Now watch the merged result.</a:t>
+            </a:r>
+            <a:endParaRPr lang="en-US" sz="1000" dirty="0">
+              <a:solidFill>
+                <a:schemeClr val="bg2">
+                  <a:lumMod val="50000"/>
+                </a:schemeClr>
+              </a:solidFill>
+            </a:endParaRPr>
+          </a:p>
+        </p:txBody>
+      </p:sp>
     </p:spTree>
     <p:extLst>
       <p:ext uri="{BB962C8B-B14F-4D97-AF65-F5344CB8AC3E}">

</xml_diff>

<commit_message>
OpenTBS : update examples
</commit_message>
<xml_diff>
--- a/demo/demo_ms_powerpoint.pptx
+++ b/demo/demo_ms_powerpoint.pptx
@@ -355,12 +355,12 @@
         </c:dLbls>
         <c:gapWidth val="150"/>
         <c:shape val="cylinder"/>
-        <c:axId val="76404992"/>
-        <c:axId val="50969216"/>
+        <c:axId val="30937472"/>
+        <c:axId val="30939008"/>
         <c:axId val="0"/>
       </c:bar3DChart>
       <c:catAx>
-        <c:axId val="76404992"/>
+        <c:axId val="30937472"/>
         <c:scaling>
           <c:orientation val="minMax"/>
         </c:scaling>
@@ -379,7 +379,7 @@
             <a:endParaRPr lang="fr-FR"/>
           </a:p>
         </c:txPr>
-        <c:crossAx val="50969216"/>
+        <c:crossAx val="30939008"/>
         <c:crosses val="autoZero"/>
         <c:auto val="1"/>
         <c:lblAlgn val="ctr"/>
@@ -387,7 +387,7 @@
         <c:noMultiLvlLbl val="0"/>
       </c:catAx>
       <c:valAx>
-        <c:axId val="50969216"/>
+        <c:axId val="30939008"/>
         <c:scaling>
           <c:orientation val="minMax"/>
           <c:max val="5"/>
@@ -400,7 +400,7 @@
         <c:majorTickMark val="out"/>
         <c:minorTickMark val="none"/>
         <c:tickLblPos val="nextTo"/>
-        <c:crossAx val="76404992"/>
+        <c:crossAx val="30937472"/>
         <c:crosses val="autoZero"/>
         <c:crossBetween val="between"/>
         <c:majorUnit val="0.5"/>
@@ -623,7 +623,7 @@
               <a:pPr>
                 <a:defRPr/>
               </a:pPr>
-              <a:t>05/02/2013</a:t>
+              <a:t>25/04/2013</a:t>
             </a:fld>
             <a:endParaRPr lang="fr-FR"/>
           </a:p>
@@ -815,7 +815,7 @@
               <a:pPr>
                 <a:defRPr/>
               </a:pPr>
-              <a:t>05/02/2013</a:t>
+              <a:t>25/04/2013</a:t>
             </a:fld>
             <a:endParaRPr lang="fr-FR"/>
           </a:p>
@@ -1017,7 +1017,7 @@
               <a:pPr>
                 <a:defRPr/>
               </a:pPr>
-              <a:t>05/02/2013</a:t>
+              <a:t>25/04/2013</a:t>
             </a:fld>
             <a:endParaRPr lang="fr-FR"/>
           </a:p>
@@ -1209,7 +1209,7 @@
               <a:pPr>
                 <a:defRPr/>
               </a:pPr>
-              <a:t>05/02/2013</a:t>
+              <a:t>25/04/2013</a:t>
             </a:fld>
             <a:endParaRPr lang="fr-FR"/>
           </a:p>
@@ -1477,7 +1477,7 @@
               <a:pPr>
                 <a:defRPr/>
               </a:pPr>
-              <a:t>05/02/2013</a:t>
+              <a:t>25/04/2013</a:t>
             </a:fld>
             <a:endParaRPr lang="fr-FR"/>
           </a:p>
@@ -1787,7 +1787,7 @@
               <a:pPr>
                 <a:defRPr/>
               </a:pPr>
-              <a:t>05/02/2013</a:t>
+              <a:t>25/04/2013</a:t>
             </a:fld>
             <a:endParaRPr lang="fr-FR"/>
           </a:p>
@@ -2231,7 +2231,7 @@
               <a:pPr>
                 <a:defRPr/>
               </a:pPr>
-              <a:t>05/02/2013</a:t>
+              <a:t>25/04/2013</a:t>
             </a:fld>
             <a:endParaRPr lang="fr-FR"/>
           </a:p>
@@ -2371,7 +2371,7 @@
               <a:pPr>
                 <a:defRPr/>
               </a:pPr>
-              <a:t>05/02/2013</a:t>
+              <a:t>25/04/2013</a:t>
             </a:fld>
             <a:endParaRPr lang="fr-FR"/>
           </a:p>
@@ -2488,7 +2488,7 @@
               <a:pPr>
                 <a:defRPr/>
               </a:pPr>
-              <a:t>05/02/2013</a:t>
+              <a:t>25/04/2013</a:t>
             </a:fld>
             <a:endParaRPr lang="fr-FR"/>
           </a:p>
@@ -2787,7 +2787,7 @@
               <a:pPr>
                 <a:defRPr/>
               </a:pPr>
-              <a:t>05/02/2013</a:t>
+              <a:t>25/04/2013</a:t>
             </a:fld>
             <a:endParaRPr lang="fr-FR"/>
           </a:p>
@@ -3065,7 +3065,7 @@
               <a:pPr>
                 <a:defRPr/>
               </a:pPr>
-              <a:t>05/02/2013</a:t>
+              <a:t>25/04/2013</a:t>
             </a:fld>
             <a:endParaRPr lang="fr-FR"/>
           </a:p>
@@ -3321,7 +3321,7 @@
               <a:pPr>
                 <a:defRPr/>
               </a:pPr>
-              <a:t>05/02/2013</a:t>
+              <a:t>25/04/2013</a:t>
             </a:fld>
             <a:endParaRPr lang="fr-FR"/>
           </a:p>
@@ -4021,10 +4021,20 @@
           <a:lstStyle/>
           <a:p>
             <a:r>
-              <a:rPr lang="fr-FR" noProof="1" smtClean="0"/>
+              <a:rPr lang="fr-FR" sz="4000" noProof="1" smtClean="0">
+                <a:solidFill>
+                  <a:srgbClr val="4F81BD"/>
+                </a:solidFill>
+                <a:latin typeface="Cambria" pitchFamily="18" charset="0"/>
+              </a:rPr>
               <a:t>Merging a picture manually</a:t>
             </a:r>
-            <a:endParaRPr lang="fr-FR" noProof="1"/>
+            <a:endParaRPr lang="fr-FR" sz="4000" noProof="1">
+              <a:solidFill>
+                <a:srgbClr val="4F81BD"/>
+              </a:solidFill>
+              <a:latin typeface="Cambria" pitchFamily="18" charset="0"/>
+            </a:endParaRPr>
           </a:p>
         </p:txBody>
       </p:sp>
@@ -4208,98 +4218,36 @@
             <a:off x="457200" y="274638"/>
             <a:ext cx="4186808" cy="778098"/>
           </a:xfrm>
+          <a:noFill/>
+          <a:ln w="9525">
+            <a:noFill/>
+            <a:miter lim="800000"/>
+            <a:headEnd/>
+            <a:tailEnd/>
+          </a:ln>
         </p:spPr>
         <p:txBody>
-          <a:bodyPr>
-            <a:scene3d>
-              <a:camera prst="orthographicFront"/>
-              <a:lightRig rig="flat" dir="tl">
-                <a:rot lat="0" lon="0" rev="6600000"/>
-              </a:lightRig>
-            </a:scene3d>
-            <a:sp3d extrusionH="25400" contourW="8890">
-              <a:bevelT w="38100" h="31750"/>
-              <a:contourClr>
-                <a:schemeClr val="accent2">
-                  <a:shade val="75000"/>
-                </a:schemeClr>
-              </a:contourClr>
-            </a:sp3d>
+          <a:bodyPr vert="horz" wrap="square" lIns="91440" tIns="45720" rIns="91440" bIns="45720" numCol="1" anchor="ctr" anchorCtr="0" compatLnSpc="1">
+            <a:prstTxWarp prst="textNoShape">
+              <a:avLst/>
+            </a:prstTxWarp>
           </a:bodyPr>
           <a:lstStyle/>
           <a:p>
             <a:r>
-              <a:rPr lang="en-US" b="1" noProof="1" smtClean="0">
-                <a:ln w="11430"/>
-                <a:gradFill>
-                  <a:gsLst>
-                    <a:gs pos="0">
-                      <a:schemeClr val="accent2">
-                        <a:tint val="70000"/>
-                        <a:satMod val="245000"/>
-                      </a:schemeClr>
-                    </a:gs>
-                    <a:gs pos="75000">
-                      <a:schemeClr val="accent2">
-                        <a:tint val="90000"/>
-                        <a:shade val="60000"/>
-                        <a:satMod val="240000"/>
-                      </a:schemeClr>
-                    </a:gs>
-                    <a:gs pos="100000">
-                      <a:schemeClr val="accent2">
-                        <a:tint val="100000"/>
-                        <a:shade val="50000"/>
-                        <a:satMod val="240000"/>
-                      </a:schemeClr>
-                    </a:gs>
-                  </a:gsLst>
-                  <a:lin ang="5400000"/>
-                </a:gradFill>
-                <a:effectLst>
-                  <a:outerShdw blurRad="50800" dist="39000" dir="5460000" algn="tl">
-                    <a:srgbClr val="000000">
-                      <a:alpha val="38000"/>
-                    </a:srgbClr>
-                  </a:outerShdw>
-                </a:effectLst>
+              <a:rPr lang="en-US" sz="4000" noProof="1">
+                <a:solidFill>
+                  <a:srgbClr val="4F81BD"/>
+                </a:solidFill>
+                <a:latin typeface="Cambria" pitchFamily="18" charset="0"/>
               </a:rPr>
               <a:t>Merging a chart</a:t>
             </a:r>
-            <a:endParaRPr lang="en-US" b="1" noProof="1">
-              <a:ln w="11430"/>
-              <a:gradFill>
-                <a:gsLst>
-                  <a:gs pos="0">
-                    <a:schemeClr val="accent2">
-                      <a:tint val="70000"/>
-                      <a:satMod val="245000"/>
-                    </a:schemeClr>
-                  </a:gs>
-                  <a:gs pos="75000">
-                    <a:schemeClr val="accent2">
-                      <a:tint val="90000"/>
-                      <a:shade val="60000"/>
-                      <a:satMod val="240000"/>
-                    </a:schemeClr>
-                  </a:gs>
-                  <a:gs pos="100000">
-                    <a:schemeClr val="accent2">
-                      <a:tint val="100000"/>
-                      <a:shade val="50000"/>
-                      <a:satMod val="240000"/>
-                    </a:schemeClr>
-                  </a:gs>
-                </a:gsLst>
-                <a:lin ang="5400000"/>
-              </a:gradFill>
-              <a:effectLst>
-                <a:outerShdw blurRad="50800" dist="39000" dir="5460000" algn="tl">
-                  <a:srgbClr val="000000">
-                    <a:alpha val="38000"/>
-                  </a:srgbClr>
-                </a:outerShdw>
-              </a:effectLst>
+            <a:endParaRPr lang="en-US" sz="4000" noProof="1">
+              <a:solidFill>
+                <a:srgbClr val="4F81BD"/>
+              </a:solidFill>
+              <a:latin typeface="Cambria" pitchFamily="18" charset="0"/>
             </a:endParaRPr>
           </a:p>
         </p:txBody>

</xml_diff>

<commit_message>
OpenTBS 1.9.1 beta - debug parameter unique
</commit_message>
<xml_diff>
--- a/demo/demo_ms_powerpoint.pptx
+++ b/demo/demo_ms_powerpoint.pptx
@@ -355,12 +355,12 @@
         </c:dLbls>
         <c:gapWidth val="150"/>
         <c:shape val="cylinder"/>
-        <c:axId val="30937472"/>
-        <c:axId val="30939008"/>
+        <c:axId val="95843456"/>
+        <c:axId val="95844992"/>
         <c:axId val="0"/>
       </c:bar3DChart>
       <c:catAx>
-        <c:axId val="30937472"/>
+        <c:axId val="95843456"/>
         <c:scaling>
           <c:orientation val="minMax"/>
         </c:scaling>
@@ -379,7 +379,7 @@
             <a:endParaRPr lang="fr-FR"/>
           </a:p>
         </c:txPr>
-        <c:crossAx val="30939008"/>
+        <c:crossAx val="95844992"/>
         <c:crosses val="autoZero"/>
         <c:auto val="1"/>
         <c:lblAlgn val="ctr"/>
@@ -387,7 +387,7 @@
         <c:noMultiLvlLbl val="0"/>
       </c:catAx>
       <c:valAx>
-        <c:axId val="30939008"/>
+        <c:axId val="95844992"/>
         <c:scaling>
           <c:orientation val="minMax"/>
           <c:max val="5"/>
@@ -400,7 +400,7 @@
         <c:majorTickMark val="out"/>
         <c:minorTickMark val="none"/>
         <c:tickLblPos val="nextTo"/>
-        <c:crossAx val="30937472"/>
+        <c:crossAx val="95843456"/>
         <c:crosses val="autoZero"/>
         <c:crossBetween val="between"/>
         <c:majorUnit val="0.5"/>
@@ -623,7 +623,7 @@
               <a:pPr>
                 <a:defRPr/>
               </a:pPr>
-              <a:t>25/04/2013</a:t>
+              <a:t>22/07/2014</a:t>
             </a:fld>
             <a:endParaRPr lang="fr-FR"/>
           </a:p>
@@ -815,7 +815,7 @@
               <a:pPr>
                 <a:defRPr/>
               </a:pPr>
-              <a:t>25/04/2013</a:t>
+              <a:t>22/07/2014</a:t>
             </a:fld>
             <a:endParaRPr lang="fr-FR"/>
           </a:p>
@@ -1017,7 +1017,7 @@
               <a:pPr>
                 <a:defRPr/>
               </a:pPr>
-              <a:t>25/04/2013</a:t>
+              <a:t>22/07/2014</a:t>
             </a:fld>
             <a:endParaRPr lang="fr-FR"/>
           </a:p>
@@ -1209,7 +1209,7 @@
               <a:pPr>
                 <a:defRPr/>
               </a:pPr>
-              <a:t>25/04/2013</a:t>
+              <a:t>22/07/2014</a:t>
             </a:fld>
             <a:endParaRPr lang="fr-FR"/>
           </a:p>
@@ -1477,7 +1477,7 @@
               <a:pPr>
                 <a:defRPr/>
               </a:pPr>
-              <a:t>25/04/2013</a:t>
+              <a:t>22/07/2014</a:t>
             </a:fld>
             <a:endParaRPr lang="fr-FR"/>
           </a:p>
@@ -1787,7 +1787,7 @@
               <a:pPr>
                 <a:defRPr/>
               </a:pPr>
-              <a:t>25/04/2013</a:t>
+              <a:t>22/07/2014</a:t>
             </a:fld>
             <a:endParaRPr lang="fr-FR"/>
           </a:p>
@@ -2231,7 +2231,7 @@
               <a:pPr>
                 <a:defRPr/>
               </a:pPr>
-              <a:t>25/04/2013</a:t>
+              <a:t>22/07/2014</a:t>
             </a:fld>
             <a:endParaRPr lang="fr-FR"/>
           </a:p>
@@ -2371,7 +2371,7 @@
               <a:pPr>
                 <a:defRPr/>
               </a:pPr>
-              <a:t>25/04/2013</a:t>
+              <a:t>22/07/2014</a:t>
             </a:fld>
             <a:endParaRPr lang="fr-FR"/>
           </a:p>
@@ -2488,7 +2488,7 @@
               <a:pPr>
                 <a:defRPr/>
               </a:pPr>
-              <a:t>25/04/2013</a:t>
+              <a:t>22/07/2014</a:t>
             </a:fld>
             <a:endParaRPr lang="fr-FR"/>
           </a:p>
@@ -2787,7 +2787,7 @@
               <a:pPr>
                 <a:defRPr/>
               </a:pPr>
-              <a:t>25/04/2013</a:t>
+              <a:t>22/07/2014</a:t>
             </a:fld>
             <a:endParaRPr lang="fr-FR"/>
           </a:p>
@@ -3065,7 +3065,7 @@
               <a:pPr>
                 <a:defRPr/>
               </a:pPr>
-              <a:t>25/04/2013</a:t>
+              <a:t>22/07/2014</a:t>
             </a:fld>
             <a:endParaRPr lang="fr-FR"/>
           </a:p>
@@ -3321,7 +3321,7 @@
               <a:pPr>
                 <a:defRPr/>
               </a:pPr>
-              <a:t>25/04/2013</a:t>
+              <a:t>22/07/2014</a:t>
             </a:fld>
             <a:endParaRPr lang="fr-FR"/>
           </a:p>
@@ -4243,12 +4243,6 @@
               </a:rPr>
               <a:t>Merging a chart</a:t>
             </a:r>
-            <a:endParaRPr lang="en-US" sz="4000" noProof="1">
-              <a:solidFill>
-                <a:srgbClr val="4F81BD"/>
-              </a:solidFill>
-              <a:latin typeface="Cambria" pitchFamily="18" charset="0"/>
-            </a:endParaRPr>
           </a:p>
         </p:txBody>
       </p:sp>

</xml_diff>

<commit_message>
OpenTBS 1.9.1-beta-2014-07-22 : credit features
</commit_message>
<xml_diff>
--- a/demo/demo_ms_powerpoint.pptx
+++ b/demo/demo_ms_powerpoint.pptx
@@ -355,12 +355,12 @@
         </c:dLbls>
         <c:gapWidth val="150"/>
         <c:shape val="cylinder"/>
-        <c:axId val="95843456"/>
-        <c:axId val="95844992"/>
+        <c:axId val="61990016"/>
+        <c:axId val="61991552"/>
         <c:axId val="0"/>
       </c:bar3DChart>
       <c:catAx>
-        <c:axId val="95843456"/>
+        <c:axId val="61990016"/>
         <c:scaling>
           <c:orientation val="minMax"/>
         </c:scaling>
@@ -379,7 +379,7 @@
             <a:endParaRPr lang="fr-FR"/>
           </a:p>
         </c:txPr>
-        <c:crossAx val="95844992"/>
+        <c:crossAx val="61991552"/>
         <c:crosses val="autoZero"/>
         <c:auto val="1"/>
         <c:lblAlgn val="ctr"/>
@@ -387,7 +387,7 @@
         <c:noMultiLvlLbl val="0"/>
       </c:catAx>
       <c:valAx>
-        <c:axId val="95844992"/>
+        <c:axId val="61991552"/>
         <c:scaling>
           <c:orientation val="minMax"/>
           <c:max val="5"/>
@@ -400,7 +400,7 @@
         <c:majorTickMark val="out"/>
         <c:minorTickMark val="none"/>
         <c:tickLblPos val="nextTo"/>
-        <c:crossAx val="95843456"/>
+        <c:crossAx val="61990016"/>
         <c:crosses val="autoZero"/>
         <c:crossBetween val="between"/>
         <c:majorUnit val="0.5"/>

</xml_diff>

<commit_message>
[demo][pptx] add an advice in the model
</commit_message>
<xml_diff>
--- a/demo/demo_ms_powerpoint.pptx
+++ b/demo/demo_ms_powerpoint.pptx
@@ -355,12 +355,12 @@
         </c:dLbls>
         <c:gapWidth val="150"/>
         <c:shape val="cylinder"/>
-        <c:axId val="61990016"/>
-        <c:axId val="61991552"/>
+        <c:axId val="109867008"/>
+        <c:axId val="109868544"/>
         <c:axId val="0"/>
       </c:bar3DChart>
       <c:catAx>
-        <c:axId val="61990016"/>
+        <c:axId val="109867008"/>
         <c:scaling>
           <c:orientation val="minMax"/>
         </c:scaling>
@@ -379,7 +379,7 @@
             <a:endParaRPr lang="fr-FR"/>
           </a:p>
         </c:txPr>
-        <c:crossAx val="61991552"/>
+        <c:crossAx val="109868544"/>
         <c:crosses val="autoZero"/>
         <c:auto val="1"/>
         <c:lblAlgn val="ctr"/>
@@ -387,7 +387,7 @@
         <c:noMultiLvlLbl val="0"/>
       </c:catAx>
       <c:valAx>
-        <c:axId val="61991552"/>
+        <c:axId val="109868544"/>
         <c:scaling>
           <c:orientation val="minMax"/>
           <c:max val="5"/>
@@ -400,7 +400,7 @@
         <c:majorTickMark val="out"/>
         <c:minorTickMark val="none"/>
         <c:tickLblPos val="nextTo"/>
-        <c:crossAx val="61990016"/>
+        <c:crossAx val="109867008"/>
         <c:crosses val="autoZero"/>
         <c:crossBetween val="between"/>
         <c:majorUnit val="0.5"/>
@@ -623,7 +623,7 @@
               <a:pPr>
                 <a:defRPr/>
               </a:pPr>
-              <a:t>22/07/2014</a:t>
+              <a:t>25/03/2016</a:t>
             </a:fld>
             <a:endParaRPr lang="fr-FR"/>
           </a:p>
@@ -815,7 +815,7 @@
               <a:pPr>
                 <a:defRPr/>
               </a:pPr>
-              <a:t>22/07/2014</a:t>
+              <a:t>25/03/2016</a:t>
             </a:fld>
             <a:endParaRPr lang="fr-FR"/>
           </a:p>
@@ -1017,7 +1017,7 @@
               <a:pPr>
                 <a:defRPr/>
               </a:pPr>
-              <a:t>22/07/2014</a:t>
+              <a:t>25/03/2016</a:t>
             </a:fld>
             <a:endParaRPr lang="fr-FR"/>
           </a:p>
@@ -1209,7 +1209,7 @@
               <a:pPr>
                 <a:defRPr/>
               </a:pPr>
-              <a:t>22/07/2014</a:t>
+              <a:t>25/03/2016</a:t>
             </a:fld>
             <a:endParaRPr lang="fr-FR"/>
           </a:p>
@@ -1477,7 +1477,7 @@
               <a:pPr>
                 <a:defRPr/>
               </a:pPr>
-              <a:t>22/07/2014</a:t>
+              <a:t>25/03/2016</a:t>
             </a:fld>
             <a:endParaRPr lang="fr-FR"/>
           </a:p>
@@ -1787,7 +1787,7 @@
               <a:pPr>
                 <a:defRPr/>
               </a:pPr>
-              <a:t>22/07/2014</a:t>
+              <a:t>25/03/2016</a:t>
             </a:fld>
             <a:endParaRPr lang="fr-FR"/>
           </a:p>
@@ -2231,7 +2231,7 @@
               <a:pPr>
                 <a:defRPr/>
               </a:pPr>
-              <a:t>22/07/2014</a:t>
+              <a:t>25/03/2016</a:t>
             </a:fld>
             <a:endParaRPr lang="fr-FR"/>
           </a:p>
@@ -2371,7 +2371,7 @@
               <a:pPr>
                 <a:defRPr/>
               </a:pPr>
-              <a:t>22/07/2014</a:t>
+              <a:t>25/03/2016</a:t>
             </a:fld>
             <a:endParaRPr lang="fr-FR"/>
           </a:p>
@@ -2488,7 +2488,7 @@
               <a:pPr>
                 <a:defRPr/>
               </a:pPr>
-              <a:t>22/07/2014</a:t>
+              <a:t>25/03/2016</a:t>
             </a:fld>
             <a:endParaRPr lang="fr-FR"/>
           </a:p>
@@ -2787,7 +2787,7 @@
               <a:pPr>
                 <a:defRPr/>
               </a:pPr>
-              <a:t>22/07/2014</a:t>
+              <a:t>25/03/2016</a:t>
             </a:fld>
             <a:endParaRPr lang="fr-FR"/>
           </a:p>
@@ -3065,7 +3065,7 @@
               <a:pPr>
                 <a:defRPr/>
               </a:pPr>
-              <a:t>22/07/2014</a:t>
+              <a:t>25/03/2016</a:t>
             </a:fld>
             <a:endParaRPr lang="fr-FR"/>
           </a:p>
@@ -3321,7 +3321,7 @@
               <a:pPr>
                 <a:defRPr/>
               </a:pPr>
-              <a:t>22/07/2014</a:t>
+              <a:t>25/03/2016</a:t>
             </a:fld>
             <a:endParaRPr lang="fr-FR"/>
           </a:p>
@@ -3857,7 +3857,7 @@
         </p:nvSpPr>
         <p:spPr>
           <a:xfrm>
-            <a:off x="685800" y="2130425"/>
+            <a:off x="611560" y="2276872"/>
             <a:ext cx="7772400" cy="2306638"/>
           </a:xfrm>
         </p:spPr>
@@ -3890,7 +3890,15 @@
             </a:br>
             <a:r>
               <a:rPr lang="fr-FR" sz="2000" noProof="1" smtClean="0"/>
-              <a:t>The current document has been generated at [onshow..now;frm=‘yyyy-mm-dd hh:nn:ss’]</a:t>
+              <a:t>The current document has been generated at [onshow..</a:t>
+            </a:r>
+            <a:r>
+              <a:rPr lang="fr-FR" sz="2000" noProof="1" smtClean="0"/>
+              <a:t>now;frm='yyyy-mm-dd hh:nn:ss']</a:t>
+            </a:r>
+            <a:r>
+              <a:rPr lang="fr-FR" sz="2000" noProof="1" smtClean="0"/>
+              <a:t/>
             </a:r>
             <a:br>
               <a:rPr lang="fr-FR" sz="2000" noProof="1" smtClean="0"/>
@@ -3969,6 +3977,106 @@
                 </a:solidFill>
               </a:rPr>
               <a:t>There is a restriction specific to PowerPoint Presentations: it is not possible to multiply slides. But you can delete specific slides.</a:t>
+            </a:r>
+            <a:endParaRPr lang="en-US" sz="1200" dirty="0">
+              <a:solidFill>
+                <a:schemeClr val="accent2">
+                  <a:lumMod val="75000"/>
+                </a:schemeClr>
+              </a:solidFill>
+            </a:endParaRPr>
+          </a:p>
+        </p:txBody>
+      </p:sp>
+      <p:sp>
+        <p:nvSpPr>
+          <p:cNvPr id="4" name="Rectangle à coins arrondis 3"/>
+          <p:cNvSpPr/>
+          <p:nvPr/>
+        </p:nvSpPr>
+        <p:spPr>
+          <a:xfrm>
+            <a:off x="5076056" y="476672"/>
+            <a:ext cx="3600400" cy="1080120"/>
+          </a:xfrm>
+          <a:prstGeom prst="wedgeRoundRectCallout">
+            <a:avLst>
+              <a:gd name="adj1" fmla="val -46936"/>
+              <a:gd name="adj2" fmla="val 97722"/>
+              <a:gd name="adj3" fmla="val 16667"/>
+            </a:avLst>
+          </a:prstGeom>
+        </p:spPr>
+        <p:style>
+          <a:lnRef idx="2">
+            <a:schemeClr val="accent3">
+              <a:shade val="50000"/>
+            </a:schemeClr>
+          </a:lnRef>
+          <a:fillRef idx="1">
+            <a:schemeClr val="accent3"/>
+          </a:fillRef>
+          <a:effectRef idx="0">
+            <a:schemeClr val="accent3"/>
+          </a:effectRef>
+          <a:fontRef idx="minor">
+            <a:schemeClr val="lt1"/>
+          </a:fontRef>
+        </p:style>
+        <p:txBody>
+          <a:bodyPr rtlCol="0" anchor="ctr"/>
+          <a:lstStyle/>
+          <a:p>
+            <a:pPr algn="ctr"/>
+            <a:r>
+              <a:rPr lang="en-US" sz="1200" dirty="0">
+                <a:solidFill>
+                  <a:schemeClr val="accent2">
+                    <a:lumMod val="75000"/>
+                  </a:schemeClr>
+                </a:solidFill>
+              </a:rPr>
+              <a:t>Think to set all texts to "Tools </a:t>
+            </a:r>
+            <a:r>
+              <a:rPr lang="en-US" sz="1200" dirty="0" smtClean="0">
+                <a:solidFill>
+                  <a:schemeClr val="accent2">
+                    <a:lumMod val="75000"/>
+                  </a:schemeClr>
+                </a:solidFill>
+              </a:rPr>
+              <a:t>&gt; </a:t>
+            </a:r>
+            <a:r>
+              <a:rPr lang="en-US" sz="1200" dirty="0">
+                <a:solidFill>
+                  <a:schemeClr val="accent2">
+                    <a:lumMod val="75000"/>
+                  </a:schemeClr>
+                </a:solidFill>
+              </a:rPr>
+              <a:t>Language </a:t>
+            </a:r>
+            <a:r>
+              <a:rPr lang="en-US" sz="1200" dirty="0" smtClean="0">
+                <a:solidFill>
+                  <a:schemeClr val="accent2">
+                    <a:lumMod val="75000"/>
+                  </a:schemeClr>
+                </a:solidFill>
+              </a:rPr>
+              <a:t>&gt; </a:t>
+            </a:r>
+            <a:r>
+              <a:rPr lang="en-US" sz="1200" dirty="0">
+                <a:solidFill>
+                  <a:schemeClr val="accent2">
+                    <a:lumMod val="75000"/>
+                  </a:schemeClr>
+                </a:solidFill>
+              </a:rPr>
+              <a:t>No check" when you edit the PowerPoint presentation, otherwise some TBS fields can be split by XML tags about the language and spell checking.</a:t>
             </a:r>
             <a:endParaRPr lang="en-US" sz="1200" dirty="0">
               <a:solidFill>

</xml_diff>

<commit_message>
[demo][pptx] add another advice in the model
</commit_message>
<xml_diff>
--- a/demo/demo_ms_powerpoint.pptx
+++ b/demo/demo_ms_powerpoint.pptx
@@ -3890,11 +3890,15 @@
             </a:br>
             <a:r>
               <a:rPr lang="fr-FR" sz="2000" noProof="1" smtClean="0"/>
-              <a:t>The current document has been generated at [onshow..</a:t>
+              <a:t>The current document has been </a:t>
             </a:r>
             <a:r>
               <a:rPr lang="fr-FR" sz="2000" noProof="1" smtClean="0"/>
-              <a:t>now;frm='yyyy-mm-dd hh:nn:ss']</a:t>
+              <a:t>generated </a:t>
+            </a:r>
+            <a:r>
+              <a:rPr lang="fr-FR" sz="2000" noProof="1"/>
+              <a:t>at [onshow..now;frm='yyyy-mm-dd hh:nn:ss']</a:t>
             </a:r>
             <a:r>
               <a:rPr lang="fr-FR" sz="2000" noProof="1" smtClean="0"/>
@@ -3996,13 +4000,13 @@
         </p:nvSpPr>
         <p:spPr>
           <a:xfrm>
-            <a:off x="5076056" y="476672"/>
-            <a:ext cx="3600400" cy="1080120"/>
+            <a:off x="4355976" y="476672"/>
+            <a:ext cx="4320480" cy="1296144"/>
           </a:xfrm>
           <a:prstGeom prst="wedgeRoundRectCallout">
             <a:avLst>
-              <a:gd name="adj1" fmla="val -46936"/>
-              <a:gd name="adj2" fmla="val 97722"/>
+              <a:gd name="adj1" fmla="val -49412"/>
+              <a:gd name="adj2" fmla="val 76777"/>
               <a:gd name="adj3" fmla="val 16667"/>
             </a:avLst>
           </a:prstGeom>
@@ -4076,7 +4080,66 @@
                   </a:schemeClr>
                 </a:solidFill>
               </a:rPr>
-              <a:t>No check" when you edit the PowerPoint presentation, otherwise some TBS fields can be split by XML tags about the language and spell checking.</a:t>
+              <a:t>No check" when you edit the PowerPoint presentation, otherwise some TBS fields can be split by XML tags about the language and spell checking</a:t>
+            </a:r>
+            <a:r>
+              <a:rPr lang="en-US" sz="1200" dirty="0" smtClean="0">
+                <a:solidFill>
+                  <a:schemeClr val="accent2">
+                    <a:lumMod val="75000"/>
+                  </a:schemeClr>
+                </a:solidFill>
+              </a:rPr>
+              <a:t>.</a:t>
+            </a:r>
+            <a:br>
+              <a:rPr lang="en-US" sz="1200" dirty="0" smtClean="0">
+                <a:solidFill>
+                  <a:schemeClr val="accent2">
+                    <a:lumMod val="75000"/>
+                  </a:schemeClr>
+                </a:solidFill>
+              </a:rPr>
+            </a:br>
+            <a:endParaRPr lang="en-US" sz="1200" dirty="0" smtClean="0">
+              <a:solidFill>
+                <a:schemeClr val="accent2">
+                  <a:lumMod val="75000"/>
+                </a:schemeClr>
+              </a:solidFill>
+            </a:endParaRPr>
+          </a:p>
+          <a:p>
+            <a:pPr algn="ctr"/>
+            <a:r>
+              <a:rPr lang="en-US" sz="1200" dirty="0" smtClean="0">
+                <a:solidFill>
+                  <a:schemeClr val="accent2">
+                    <a:lumMod val="75000"/>
+                  </a:schemeClr>
+                </a:solidFill>
+              </a:rPr>
+              <a:t>If some TBS fields are not merged or raise an error, then you can cut the field and paste it back using </a:t>
+            </a:r>
+            <a:r>
+              <a:rPr lang="en-US" sz="1200" i="1" dirty="0" smtClean="0">
+                <a:solidFill>
+                  <a:schemeClr val="accent2">
+                    <a:lumMod val="75000"/>
+                  </a:schemeClr>
+                </a:solidFill>
+              </a:rPr>
+              <a:t>Paste / Keep Text Only</a:t>
+            </a:r>
+            <a:r>
+              <a:rPr lang="en-US" sz="1200" dirty="0" smtClean="0">
+                <a:solidFill>
+                  <a:schemeClr val="accent2">
+                    <a:lumMod val="75000"/>
+                  </a:schemeClr>
+                </a:solidFill>
+              </a:rPr>
+              <a:t>.</a:t>
             </a:r>
             <a:endParaRPr lang="en-US" sz="1200" dirty="0">
               <a:solidFill>

</xml_diff>

<commit_message>
[demo] change chart in the pptx template
</commit_message>
<xml_diff>
--- a/demo/demo_ms_powerpoint.pptx
+++ b/demo/demo_ms_powerpoint.pptx
@@ -219,13 +219,13 @@
                   <c:v>1.5</c:v>
                 </c:pt>
                 <c:pt idx="1">
-                  <c:v>1.1000000000000001</c:v>
+                  <c:v>1.5</c:v>
                 </c:pt>
                 <c:pt idx="2">
-                  <c:v>0.5</c:v>
+                  <c:v>1.5</c:v>
                 </c:pt>
                 <c:pt idx="3">
-                  <c:v>0.2</c:v>
+                  <c:v>1.5</c:v>
                 </c:pt>
               </c:numCache>
             </c:numRef>
@@ -273,13 +273,13 @@
                 <c:formatCode>General</c:formatCode>
                 <c:ptCount val="4"/>
                 <c:pt idx="0">
-                  <c:v>0.3</c:v>
+                  <c:v>1.5</c:v>
                 </c:pt>
                 <c:pt idx="1">
-                  <c:v>0.7</c:v>
+                  <c:v>1.5</c:v>
                 </c:pt>
                 <c:pt idx="2">
-                  <c:v>1.2</c:v>
+                  <c:v>1.5</c:v>
                 </c:pt>
                 <c:pt idx="3">
                   <c:v>1.5</c:v>
@@ -333,13 +333,13 @@
                   <c:v>1.5</c:v>
                 </c:pt>
                 <c:pt idx="1">
-                  <c:v>1.7</c:v>
+                  <c:v>1.5</c:v>
                 </c:pt>
                 <c:pt idx="2">
-                  <c:v>1.6</c:v>
+                  <c:v>1.5</c:v>
                 </c:pt>
                 <c:pt idx="3">
-                  <c:v>1.3</c:v>
+                  <c:v>1.5</c:v>
                 </c:pt>
               </c:numCache>
             </c:numRef>
@@ -355,12 +355,12 @@
         </c:dLbls>
         <c:gapWidth val="150"/>
         <c:shape val="cylinder"/>
-        <c:axId val="109867008"/>
-        <c:axId val="109868544"/>
+        <c:axId val="112102400"/>
+        <c:axId val="112104192"/>
         <c:axId val="0"/>
       </c:bar3DChart>
       <c:catAx>
-        <c:axId val="109867008"/>
+        <c:axId val="112102400"/>
         <c:scaling>
           <c:orientation val="minMax"/>
         </c:scaling>
@@ -379,7 +379,7 @@
             <a:endParaRPr lang="fr-FR"/>
           </a:p>
         </c:txPr>
-        <c:crossAx val="109868544"/>
+        <c:crossAx val="112104192"/>
         <c:crosses val="autoZero"/>
         <c:auto val="1"/>
         <c:lblAlgn val="ctr"/>
@@ -387,7 +387,7 @@
         <c:noMultiLvlLbl val="0"/>
       </c:catAx>
       <c:valAx>
-        <c:axId val="109868544"/>
+        <c:axId val="112104192"/>
         <c:scaling>
           <c:orientation val="minMax"/>
           <c:max val="5"/>
@@ -400,7 +400,7 @@
         <c:majorTickMark val="out"/>
         <c:minorTickMark val="none"/>
         <c:tickLblPos val="nextTo"/>
-        <c:crossAx val="109867008"/>
+        <c:crossAx val="112102400"/>
         <c:crosses val="autoZero"/>
         <c:crossBetween val="between"/>
         <c:majorUnit val="0.5"/>
@@ -623,7 +623,7 @@
               <a:pPr>
                 <a:defRPr/>
               </a:pPr>
-              <a:t>25/03/2016</a:t>
+              <a:t>18/02/2019</a:t>
             </a:fld>
             <a:endParaRPr lang="fr-FR"/>
           </a:p>
@@ -815,7 +815,7 @@
               <a:pPr>
                 <a:defRPr/>
               </a:pPr>
-              <a:t>25/03/2016</a:t>
+              <a:t>18/02/2019</a:t>
             </a:fld>
             <a:endParaRPr lang="fr-FR"/>
           </a:p>
@@ -1017,7 +1017,7 @@
               <a:pPr>
                 <a:defRPr/>
               </a:pPr>
-              <a:t>25/03/2016</a:t>
+              <a:t>18/02/2019</a:t>
             </a:fld>
             <a:endParaRPr lang="fr-FR"/>
           </a:p>
@@ -1209,7 +1209,7 @@
               <a:pPr>
                 <a:defRPr/>
               </a:pPr>
-              <a:t>25/03/2016</a:t>
+              <a:t>18/02/2019</a:t>
             </a:fld>
             <a:endParaRPr lang="fr-FR"/>
           </a:p>
@@ -1477,7 +1477,7 @@
               <a:pPr>
                 <a:defRPr/>
               </a:pPr>
-              <a:t>25/03/2016</a:t>
+              <a:t>18/02/2019</a:t>
             </a:fld>
             <a:endParaRPr lang="fr-FR"/>
           </a:p>
@@ -1787,7 +1787,7 @@
               <a:pPr>
                 <a:defRPr/>
               </a:pPr>
-              <a:t>25/03/2016</a:t>
+              <a:t>18/02/2019</a:t>
             </a:fld>
             <a:endParaRPr lang="fr-FR"/>
           </a:p>
@@ -2231,7 +2231,7 @@
               <a:pPr>
                 <a:defRPr/>
               </a:pPr>
-              <a:t>25/03/2016</a:t>
+              <a:t>18/02/2019</a:t>
             </a:fld>
             <a:endParaRPr lang="fr-FR"/>
           </a:p>
@@ -2371,7 +2371,7 @@
               <a:pPr>
                 <a:defRPr/>
               </a:pPr>
-              <a:t>25/03/2016</a:t>
+              <a:t>18/02/2019</a:t>
             </a:fld>
             <a:endParaRPr lang="fr-FR"/>
           </a:p>
@@ -2488,7 +2488,7 @@
               <a:pPr>
                 <a:defRPr/>
               </a:pPr>
-              <a:t>25/03/2016</a:t>
+              <a:t>18/02/2019</a:t>
             </a:fld>
             <a:endParaRPr lang="fr-FR"/>
           </a:p>
@@ -2787,7 +2787,7 @@
               <a:pPr>
                 <a:defRPr/>
               </a:pPr>
-              <a:t>25/03/2016</a:t>
+              <a:t>18/02/2019</a:t>
             </a:fld>
             <a:endParaRPr lang="fr-FR"/>
           </a:p>
@@ -3065,7 +3065,7 @@
               <a:pPr>
                 <a:defRPr/>
               </a:pPr>
-              <a:t>25/03/2016</a:t>
+              <a:t>18/02/2019</a:t>
             </a:fld>
             <a:endParaRPr lang="fr-FR"/>
           </a:p>
@@ -3321,7 +3321,7 @@
               <a:pPr>
                 <a:defRPr/>
               </a:pPr>
-              <a:t>25/03/2016</a:t>
+              <a:t>18/02/2019</a:t>
             </a:fld>
             <a:endParaRPr lang="fr-FR"/>
           </a:p>
@@ -3890,11 +3890,7 @@
             </a:br>
             <a:r>
               <a:rPr lang="fr-FR" sz="2000" noProof="1" smtClean="0"/>
-              <a:t>The current document has been </a:t>
-            </a:r>
-            <a:r>
-              <a:rPr lang="fr-FR" sz="2000" noProof="1" smtClean="0"/>
-              <a:t>generated </a:t>
+              <a:t>The current document has been generated </a:t>
             </a:r>
             <a:r>
               <a:rPr lang="fr-FR" sz="2000" noProof="1"/>
@@ -4424,7 +4420,7 @@
           <p:nvPr>
             <p:extLst>
               <p:ext uri="{D42A27DB-BD31-4B8C-83A1-F6EECF244321}">
-                <p14:modId xmlns:p14="http://schemas.microsoft.com/office/powerpoint/2010/main" val="2463261424"/>
+                <p14:modId xmlns:p14="http://schemas.microsoft.com/office/powerpoint/2010/main" val="2512863157"/>
               </p:ext>
             </p:extLst>
           </p:nvPr>
@@ -4484,7 +4480,27 @@
                   </a:schemeClr>
                 </a:solidFill>
               </a:rPr>
-              <a:t>It’s quite easy to merge a chart in a PowerPoint Presentation. You can see that in the template, no bars can go above value « 2 ». Now watch the merged result.</a:t>
+              <a:t>It’s quite easy to merge a chart in a PowerPoint Presentation. You can see that in the template, </a:t>
+            </a:r>
+            <a:r>
+              <a:rPr lang="en-US" sz="1000" dirty="0" smtClean="0">
+                <a:solidFill>
+                  <a:schemeClr val="bg2">
+                    <a:lumMod val="50000"/>
+                  </a:schemeClr>
+                </a:solidFill>
+              </a:rPr>
+              <a:t>all bars have equal values. </a:t>
+            </a:r>
+            <a:r>
+              <a:rPr lang="en-US" sz="1000" dirty="0" smtClean="0">
+                <a:solidFill>
+                  <a:schemeClr val="bg2">
+                    <a:lumMod val="50000"/>
+                  </a:schemeClr>
+                </a:solidFill>
+              </a:rPr>
+              <a:t>Now watch the merged result.</a:t>
             </a:r>
             <a:endParaRPr lang="en-US" sz="1000" dirty="0">
               <a:solidFill>

</xml_diff>